<commit_message>
updated README and added qn example qc image
</commit_message>
<xml_diff>
--- a/examples/pipeline_overview.pptx
+++ b/examples/pipeline_overview.pptx
@@ -5,11 +5,12 @@
     <p:sldMasterId id="2147483648" r:id="rId1"/>
   </p:sldMasterIdLst>
   <p:notesMasterIdLst>
-    <p:notesMasterId r:id="rId4"/>
+    <p:notesMasterId r:id="rId5"/>
   </p:notesMasterIdLst>
   <p:sldIdLst>
     <p:sldId id="256" r:id="rId2"/>
     <p:sldId id="257" r:id="rId3"/>
+    <p:sldId id="258" r:id="rId4"/>
   </p:sldIdLst>
   <p:sldSz cx="12192000" cy="6858000"/>
   <p:notesSz cx="6858000" cy="9144000"/>
@@ -108,6 +109,11 @@
       </a:defRPr>
     </a:lvl9pPr>
   </p:defaultTextStyle>
+  <p:extLst>
+    <p:ext uri="{EFAFB233-063F-42B5-8137-9DF3F51BA10A}">
+      <p15:sldGuideLst xmlns:p15="http://schemas.microsoft.com/office/powerpoint/2012/main"/>
+    </p:ext>
+  </p:extLst>
 </p:presentation>
 </file>
 
@@ -4273,15 +4279,7 @@
                     <a:ea typeface="PT Sans Narrow" charset="-52"/>
                     <a:cs typeface="PT Sans Narrow" charset="-52"/>
                   </a:rPr>
-                  <a:t>It </a:t>
-                </a:r>
-                <a:r>
-                  <a:rPr kumimoji="1" lang="en-US" altLang="ko-KR" sz="1200" dirty="0" smtClean="0">
-                    <a:latin typeface="PT Sans Narrow" charset="-52"/>
-                    <a:ea typeface="PT Sans Narrow" charset="-52"/>
-                    <a:cs typeface="PT Sans Narrow" charset="-52"/>
-                  </a:rPr>
-                  <a:t>reads the actual acquisition timing from </a:t>
+                  <a:t>It reads the actual acquisition timing from </a:t>
                 </a:r>
                 <a:r>
                   <a:rPr kumimoji="1" lang="en-US" altLang="ko-KR" sz="1200" dirty="0" err="1" smtClean="0">
@@ -4333,15 +4331,7 @@
                     <a:ea typeface="PT Sans Narrow" charset="-52"/>
                     <a:cs typeface="PT Sans Narrow" charset="-52"/>
                   </a:rPr>
-                  <a:t>It uses </a:t>
-                </a:r>
-                <a:r>
-                  <a:rPr kumimoji="1" lang="en-US" altLang="ko-KR" sz="1200" dirty="0" smtClean="0">
-                    <a:latin typeface="PT Sans Narrow" charset="-52"/>
-                    <a:ea typeface="PT Sans Narrow" charset="-52"/>
-                    <a:cs typeface="PT Sans Narrow" charset="-52"/>
-                  </a:rPr>
-                  <a:t>the first functional image or </a:t>
+                  <a:t>It uses the first functional image or </a:t>
                 </a:r>
                 <a:r>
                   <a:rPr kumimoji="1" lang="en-US" altLang="ko-KR" sz="1200" dirty="0" err="1" smtClean="0">
@@ -4373,11 +4363,6 @@
                   </a:rPr>
                   <a:t>It saves 6 movement parameters for each run</a:t>
                 </a:r>
-                <a:endParaRPr kumimoji="1" lang="en-US" altLang="ko-KR" sz="1200" dirty="0" smtClean="0">
-                  <a:latin typeface="PT Sans Narrow" charset="-52"/>
-                  <a:ea typeface="PT Sans Narrow" charset="-52"/>
-                  <a:cs typeface="PT Sans Narrow" charset="-52"/>
-                </a:endParaRPr>
               </a:p>
             </p:txBody>
           </p:sp>
@@ -4553,15 +4538,7 @@
                     <a:ea typeface="PT Sans Narrow" charset="-52"/>
                     <a:cs typeface="PT Sans Narrow" charset="-52"/>
                   </a:rPr>
-                  <a:t>b</a:t>
-                </a:r>
-                <a:r>
-                  <a:rPr kumimoji="1" lang="en-US" altLang="ko-KR" sz="1200" b="1" dirty="0" smtClean="0">
-                    <a:latin typeface="PT Sans Narrow" charset="-52"/>
-                    <a:ea typeface="PT Sans Narrow" charset="-52"/>
-                    <a:cs typeface="PT Sans Narrow" charset="-52"/>
-                  </a:rPr>
-                  <a:t>7: </a:t>
+                  <a:t>b7: </a:t>
                 </a:r>
                 <a:r>
                   <a:rPr kumimoji="1" lang="en-US" altLang="ko-KR" sz="1200" b="1" dirty="0" err="1" smtClean="0">
@@ -4698,11 +4675,6 @@
                   </a:rPr>
                   <a:t>)</a:t>
                 </a:r>
-                <a:endParaRPr kumimoji="1" lang="en-US" altLang="ko-KR" sz="1200" dirty="0" smtClean="0">
-                  <a:latin typeface="PT Sans Narrow" charset="-52"/>
-                  <a:ea typeface="PT Sans Narrow" charset="-52"/>
-                  <a:cs typeface="PT Sans Narrow" charset="-52"/>
-                </a:endParaRPr>
               </a:p>
               <a:p>
                 <a:pPr marL="171450" lvl="1" indent="-171450">
@@ -5035,11 +5007,6 @@
                   </a:rPr>
                   <a:t>/ICA-AROMA</a:t>
                 </a:r>
-                <a:endParaRPr kumimoji="1" lang="en-US" altLang="ko-KR" sz="1200" dirty="0" smtClean="0">
-                  <a:latin typeface="PT Sans Narrow" charset="-52"/>
-                  <a:ea typeface="PT Sans Narrow" charset="-52"/>
-                  <a:cs typeface="PT Sans Narrow" charset="-52"/>
-                </a:endParaRPr>
               </a:p>
             </p:txBody>
           </p:sp>
@@ -6066,15 +6033,7 @@
                     <a:ea typeface="PT Sans Narrow" charset="-52"/>
                     <a:cs typeface="PT Sans Narrow" charset="-52"/>
                   </a:rPr>
-                  <a:t>It </a:t>
-                </a:r>
-                <a:r>
-                  <a:rPr kumimoji="1" lang="en-US" altLang="ko-KR" sz="1200" dirty="0" smtClean="0">
-                    <a:latin typeface="PT Sans Narrow" charset="-52"/>
-                    <a:ea typeface="PT Sans Narrow" charset="-52"/>
-                    <a:cs typeface="PT Sans Narrow" charset="-52"/>
-                  </a:rPr>
-                  <a:t>reads the actual acquisition timing from </a:t>
+                  <a:t>It reads the actual acquisition timing from </a:t>
                 </a:r>
                 <a:r>
                   <a:rPr kumimoji="1" lang="en-US" altLang="ko-KR" sz="1200" dirty="0" err="1" smtClean="0">
@@ -6126,15 +6085,7 @@
                     <a:ea typeface="PT Sans Narrow" charset="-52"/>
                     <a:cs typeface="PT Sans Narrow" charset="-52"/>
                   </a:rPr>
-                  <a:t>It uses </a:t>
-                </a:r>
-                <a:r>
-                  <a:rPr kumimoji="1" lang="en-US" altLang="ko-KR" sz="1200" dirty="0" smtClean="0">
-                    <a:latin typeface="PT Sans Narrow" charset="-52"/>
-                    <a:ea typeface="PT Sans Narrow" charset="-52"/>
-                    <a:cs typeface="PT Sans Narrow" charset="-52"/>
-                  </a:rPr>
-                  <a:t>the first functional image or </a:t>
+                  <a:t>It uses the first functional image or </a:t>
                 </a:r>
                 <a:r>
                   <a:rPr kumimoji="1" lang="en-US" altLang="ko-KR" sz="1200" dirty="0" err="1" smtClean="0">
@@ -6166,11 +6117,6 @@
                   </a:rPr>
                   <a:t>It saves 6 movement parameters for each run</a:t>
                 </a:r>
-                <a:endParaRPr kumimoji="1" lang="en-US" altLang="ko-KR" sz="1200" dirty="0" smtClean="0">
-                  <a:latin typeface="PT Sans Narrow" charset="-52"/>
-                  <a:ea typeface="PT Sans Narrow" charset="-52"/>
-                  <a:cs typeface="PT Sans Narrow" charset="-52"/>
-                </a:endParaRPr>
               </a:p>
             </p:txBody>
           </p:sp>
@@ -6335,15 +6281,7 @@
                     <a:ea typeface="PT Sans Narrow" charset="-52"/>
                     <a:cs typeface="PT Sans Narrow" charset="-52"/>
                   </a:rPr>
-                  <a:t>SKIP THIS (b</a:t>
-                </a:r>
-                <a:r>
-                  <a:rPr kumimoji="1" lang="en-US" altLang="ko-KR" sz="1200" b="1" dirty="0" smtClean="0">
-                    <a:latin typeface="PT Sans Narrow" charset="-52"/>
-                    <a:ea typeface="PT Sans Narrow" charset="-52"/>
-                    <a:cs typeface="PT Sans Narrow" charset="-52"/>
-                  </a:rPr>
-                  <a:t>7: </a:t>
+                  <a:t>SKIP THIS (b7: </a:t>
                 </a:r>
                 <a:r>
                   <a:rPr kumimoji="1" lang="en-US" altLang="ko-KR" sz="1200" b="1" dirty="0" err="1" smtClean="0">
@@ -6419,7 +6357,15 @@
                     <a:ea typeface="PT Sans Narrow" charset="-52"/>
                     <a:cs typeface="PT Sans Narrow" charset="-52"/>
                   </a:rPr>
-                  <a:t>egmentation of the </a:t>
+                  <a:t>egmentation of the realigned functional images using SPM12’s tissue probability map (</a:t>
+                </a:r>
+                <a:r>
+                  <a:rPr kumimoji="1" lang="en-US" altLang="ko-KR" sz="1200" dirty="0" err="1" smtClean="0">
+                    <a:latin typeface="PT Sans Narrow" charset="-52"/>
+                    <a:ea typeface="PT Sans Narrow" charset="-52"/>
+                    <a:cs typeface="PT Sans Narrow" charset="-52"/>
+                  </a:rPr>
+                  <a:t>TPM.nii</a:t>
                 </a:r>
                 <a:r>
                   <a:rPr kumimoji="1" lang="en-US" altLang="ko-KR" sz="1200" dirty="0" smtClean="0">
@@ -6427,29 +6373,8 @@
                     <a:ea typeface="PT Sans Narrow" charset="-52"/>
                     <a:cs typeface="PT Sans Narrow" charset="-52"/>
                   </a:rPr>
-                  <a:t>realigned functional images using SPM12’s tissue probability map (</a:t>
-                </a:r>
-                <a:r>
-                  <a:rPr kumimoji="1" lang="en-US" altLang="ko-KR" sz="1200" dirty="0" err="1" smtClean="0">
-                    <a:latin typeface="PT Sans Narrow" charset="-52"/>
-                    <a:ea typeface="PT Sans Narrow" charset="-52"/>
-                    <a:cs typeface="PT Sans Narrow" charset="-52"/>
-                  </a:rPr>
-                  <a:t>TPM.nii</a:t>
-                </a:r>
-                <a:r>
-                  <a:rPr kumimoji="1" lang="en-US" altLang="ko-KR" sz="1200" dirty="0" smtClean="0">
-                    <a:latin typeface="PT Sans Narrow" charset="-52"/>
-                    <a:ea typeface="PT Sans Narrow" charset="-52"/>
-                    <a:cs typeface="PT Sans Narrow" charset="-52"/>
-                  </a:rPr>
                   <a:t>)</a:t>
                 </a:r>
-                <a:endParaRPr kumimoji="1" lang="en-US" altLang="ko-KR" sz="1200" dirty="0" smtClean="0">
-                  <a:latin typeface="PT Sans Narrow" charset="-52"/>
-                  <a:ea typeface="PT Sans Narrow" charset="-52"/>
-                  <a:cs typeface="PT Sans Narrow" charset="-52"/>
-                </a:endParaRPr>
               </a:p>
               <a:p>
                 <a:pPr marL="171450" lvl="1" indent="-171450">
@@ -6766,11 +6691,6 @@
                   </a:rPr>
                   <a:t>/ICA-AROMA</a:t>
                 </a:r>
-                <a:endParaRPr kumimoji="1" lang="en-US" altLang="ko-KR" sz="1200" dirty="0" smtClean="0">
-                  <a:latin typeface="PT Sans Narrow" charset="-52"/>
-                  <a:ea typeface="PT Sans Narrow" charset="-52"/>
-                  <a:cs typeface="PT Sans Narrow" charset="-52"/>
-                </a:endParaRPr>
               </a:p>
             </p:txBody>
           </p:sp>
@@ -6816,6 +6736,728 @@
     <p:extLst>
       <p:ext uri="{BB962C8B-B14F-4D97-AF65-F5344CB8AC3E}">
         <p14:creationId xmlns:p14="http://schemas.microsoft.com/office/powerpoint/2010/main" val="1751780129"/>
+      </p:ext>
+    </p:extLst>
+  </p:cSld>
+  <p:clrMapOvr>
+    <a:masterClrMapping/>
+  </p:clrMapOvr>
+</p:sld>
+</file>
+
+<file path=ppt/slides/slide3.xml><?xml version="1.0" encoding="utf-8"?>
+<p:sld xmlns:a="http://schemas.openxmlformats.org/drawingml/2006/main" xmlns:r="http://schemas.openxmlformats.org/officeDocument/2006/relationships" xmlns:p="http://schemas.openxmlformats.org/presentationml/2006/main">
+  <p:cSld>
+    <p:spTree>
+      <p:nvGrpSpPr>
+        <p:cNvPr id="1" name=""/>
+        <p:cNvGrpSpPr/>
+        <p:nvPr/>
+      </p:nvGrpSpPr>
+      <p:grpSpPr>
+        <a:xfrm>
+          <a:off x="0" y="0"/>
+          <a:ext cx="0" cy="0"/>
+          <a:chOff x="0" y="0"/>
+          <a:chExt cx="0" cy="0"/>
+        </a:xfrm>
+      </p:grpSpPr>
+      <p:grpSp>
+        <p:nvGrpSpPr>
+          <p:cNvPr id="43" name="그룹 42"/>
+          <p:cNvGrpSpPr/>
+          <p:nvPr/>
+        </p:nvGrpSpPr>
+        <p:grpSpPr>
+          <a:xfrm>
+            <a:off x="0" y="132522"/>
+            <a:ext cx="12383329" cy="7818270"/>
+            <a:chOff x="0" y="132522"/>
+            <a:chExt cx="12383329" cy="7818270"/>
+          </a:xfrm>
+        </p:grpSpPr>
+        <p:sp>
+          <p:nvSpPr>
+            <p:cNvPr id="42" name="직사각형 41"/>
+            <p:cNvSpPr/>
+            <p:nvPr/>
+          </p:nvSpPr>
+          <p:spPr>
+            <a:xfrm>
+              <a:off x="13253" y="132522"/>
+              <a:ext cx="12370076" cy="7816838"/>
+            </a:xfrm>
+            <a:prstGeom prst="rect">
+              <a:avLst/>
+            </a:prstGeom>
+            <a:solidFill>
+              <a:schemeClr val="bg1"/>
+            </a:solidFill>
+            <a:ln>
+              <a:noFill/>
+            </a:ln>
+          </p:spPr>
+          <p:style>
+            <a:lnRef idx="2">
+              <a:schemeClr val="accent1">
+                <a:shade val="50000"/>
+              </a:schemeClr>
+            </a:lnRef>
+            <a:fillRef idx="1">
+              <a:schemeClr val="accent1"/>
+            </a:fillRef>
+            <a:effectRef idx="0">
+              <a:schemeClr val="accent1"/>
+            </a:effectRef>
+            <a:fontRef idx="minor">
+              <a:schemeClr val="lt1"/>
+            </a:fontRef>
+          </p:style>
+          <p:txBody>
+            <a:bodyPr rtlCol="0" anchor="ctr"/>
+            <a:lstStyle/>
+            <a:p>
+              <a:pPr algn="ctr"/>
+              <a:endParaRPr kumimoji="1" lang="ko-KR" altLang="en-US"/>
+            </a:p>
+          </p:txBody>
+        </p:sp>
+        <p:pic>
+          <p:nvPicPr>
+            <p:cNvPr id="3" name="그림 2"/>
+            <p:cNvPicPr>
+              <a:picLocks noChangeAspect="1"/>
+            </p:cNvPicPr>
+            <p:nvPr/>
+          </p:nvPicPr>
+          <p:blipFill>
+            <a:blip r:embed="rId2">
+              <a:extLst>
+                <a:ext uri="{28A0092B-C50C-407E-A947-70E740481C1C}">
+                  <a14:useLocalDpi xmlns:a14="http://schemas.microsoft.com/office/drawing/2010/main" val="0"/>
+                </a:ext>
+              </a:extLst>
+            </a:blip>
+            <a:stretch>
+              <a:fillRect/>
+            </a:stretch>
+          </p:blipFill>
+          <p:spPr>
+            <a:xfrm>
+              <a:off x="0" y="1003853"/>
+              <a:ext cx="4465983" cy="3349487"/>
+            </a:xfrm>
+            <a:prstGeom prst="rect">
+              <a:avLst/>
+            </a:prstGeom>
+          </p:spPr>
+        </p:pic>
+        <p:sp>
+          <p:nvSpPr>
+            <p:cNvPr id="29" name="텍스트 상자 28"/>
+            <p:cNvSpPr txBox="1"/>
+            <p:nvPr/>
+          </p:nvSpPr>
+          <p:spPr>
+            <a:xfrm>
+              <a:off x="453295" y="726854"/>
+              <a:ext cx="1609736" cy="276999"/>
+            </a:xfrm>
+            <a:prstGeom prst="rect">
+              <a:avLst/>
+            </a:prstGeom>
+            <a:solidFill>
+              <a:schemeClr val="bg1"/>
+            </a:solidFill>
+          </p:spPr>
+          <p:txBody>
+            <a:bodyPr wrap="none" rtlCol="0">
+              <a:spAutoFit/>
+            </a:bodyPr>
+            <a:lstStyle/>
+            <a:p>
+              <a:pPr algn="ctr"/>
+              <a:r>
+                <a:rPr kumimoji="1" lang="en-US" altLang="ko-KR" sz="1200" dirty="0" err="1" smtClean="0">
+                  <a:latin typeface="PT Sans Narrow" charset="-52"/>
+                  <a:ea typeface="PT Sans Narrow" charset="-52"/>
+                  <a:cs typeface="PT Sans Narrow" charset="-52"/>
+                </a:rPr>
+                <a:t>mean_before_preproc.png</a:t>
+              </a:r>
+              <a:endParaRPr kumimoji="1" lang="en-US" altLang="ko-KR" sz="1200" dirty="0" smtClean="0">
+                <a:latin typeface="PT Sans Narrow" charset="-52"/>
+                <a:ea typeface="PT Sans Narrow" charset="-52"/>
+                <a:cs typeface="PT Sans Narrow" charset="-52"/>
+              </a:endParaRPr>
+            </a:p>
+          </p:txBody>
+        </p:sp>
+        <p:pic>
+          <p:nvPicPr>
+            <p:cNvPr id="14" name="그림 13"/>
+            <p:cNvPicPr>
+              <a:picLocks noChangeAspect="1"/>
+            </p:cNvPicPr>
+            <p:nvPr/>
+          </p:nvPicPr>
+          <p:blipFill>
+            <a:blip r:embed="rId3">
+              <a:extLst>
+                <a:ext uri="{28A0092B-C50C-407E-A947-70E740481C1C}">
+                  <a14:useLocalDpi xmlns:a14="http://schemas.microsoft.com/office/drawing/2010/main" val="0"/>
+                </a:ext>
+              </a:extLst>
+            </a:blip>
+            <a:stretch>
+              <a:fillRect/>
+            </a:stretch>
+          </p:blipFill>
+          <p:spPr>
+            <a:xfrm>
+              <a:off x="4141368" y="1003853"/>
+              <a:ext cx="4728688" cy="3349487"/>
+            </a:xfrm>
+            <a:prstGeom prst="rect">
+              <a:avLst/>
+            </a:prstGeom>
+          </p:spPr>
+        </p:pic>
+        <p:sp>
+          <p:nvSpPr>
+            <p:cNvPr id="30" name="텍스트 상자 29"/>
+            <p:cNvSpPr txBox="1"/>
+            <p:nvPr/>
+          </p:nvSpPr>
+          <p:spPr>
+            <a:xfrm>
+              <a:off x="4698058" y="726854"/>
+              <a:ext cx="1402948" cy="276999"/>
+            </a:xfrm>
+            <a:prstGeom prst="rect">
+              <a:avLst/>
+            </a:prstGeom>
+            <a:solidFill>
+              <a:schemeClr val="bg1"/>
+            </a:solidFill>
+          </p:spPr>
+          <p:txBody>
+            <a:bodyPr wrap="none" rtlCol="0">
+              <a:spAutoFit/>
+            </a:bodyPr>
+            <a:lstStyle/>
+            <a:p>
+              <a:pPr algn="ctr"/>
+              <a:r>
+                <a:rPr kumimoji="1" lang="en-US" altLang="ko-KR" sz="1200" dirty="0" err="1" smtClean="0">
+                  <a:latin typeface="PT Sans Narrow" charset="-52"/>
+                  <a:ea typeface="PT Sans Narrow" charset="-52"/>
+                  <a:cs typeface="PT Sans Narrow" charset="-52"/>
+                </a:rPr>
+                <a:t>dc_func_sbref_files.png</a:t>
+              </a:r>
+              <a:endParaRPr kumimoji="1" lang="en-US" altLang="ko-KR" sz="1200" dirty="0" smtClean="0">
+                <a:latin typeface="PT Sans Narrow" charset="-52"/>
+                <a:ea typeface="PT Sans Narrow" charset="-52"/>
+                <a:cs typeface="PT Sans Narrow" charset="-52"/>
+              </a:endParaRPr>
+            </a:p>
+          </p:txBody>
+        </p:sp>
+        <p:grpSp>
+          <p:nvGrpSpPr>
+            <p:cNvPr id="35" name="그룹 34"/>
+            <p:cNvGrpSpPr/>
+            <p:nvPr/>
+          </p:nvGrpSpPr>
+          <p:grpSpPr>
+            <a:xfrm>
+              <a:off x="13252" y="4326836"/>
+              <a:ext cx="4254388" cy="3622524"/>
+              <a:chOff x="8607351" y="730816"/>
+              <a:chExt cx="4254388" cy="3622524"/>
+            </a:xfrm>
+          </p:grpSpPr>
+          <p:pic>
+            <p:nvPicPr>
+              <p:cNvPr id="15" name="그림 14"/>
+              <p:cNvPicPr>
+                <a:picLocks noChangeAspect="1"/>
+              </p:cNvPicPr>
+              <p:nvPr/>
+            </p:nvPicPr>
+            <p:blipFill>
+              <a:blip r:embed="rId4">
+                <a:extLst>
+                  <a:ext uri="{28A0092B-C50C-407E-A947-70E740481C1C}">
+                    <a14:useLocalDpi xmlns:a14="http://schemas.microsoft.com/office/drawing/2010/main" val="0"/>
+                  </a:ext>
+                </a:extLst>
+              </a:blip>
+              <a:stretch>
+                <a:fillRect/>
+              </a:stretch>
+            </p:blipFill>
+            <p:spPr>
+              <a:xfrm>
+                <a:off x="8607351" y="1003853"/>
+                <a:ext cx="4254388" cy="3349487"/>
+              </a:xfrm>
+              <a:prstGeom prst="rect">
+                <a:avLst/>
+              </a:prstGeom>
+            </p:spPr>
+          </p:pic>
+          <p:sp>
+            <p:nvSpPr>
+              <p:cNvPr id="31" name="텍스트 상자 30"/>
+              <p:cNvSpPr txBox="1"/>
+              <p:nvPr/>
+            </p:nvSpPr>
+            <p:spPr>
+              <a:xfrm>
+                <a:off x="9055017" y="730816"/>
+                <a:ext cx="1452642" cy="276999"/>
+              </a:xfrm>
+              <a:prstGeom prst="rect">
+                <a:avLst/>
+              </a:prstGeom>
+              <a:solidFill>
+                <a:schemeClr val="bg1"/>
+              </a:solidFill>
+            </p:spPr>
+            <p:txBody>
+              <a:bodyPr wrap="none" rtlCol="0">
+                <a:spAutoFit/>
+              </a:bodyPr>
+              <a:lstStyle/>
+              <a:p>
+                <a:pPr algn="ctr"/>
+                <a:r>
+                  <a:rPr kumimoji="1" lang="en-US" altLang="ko-KR" sz="1200" dirty="0" err="1" smtClean="0">
+                    <a:latin typeface="PT Sans Narrow" charset="-52"/>
+                    <a:ea typeface="PT Sans Narrow" charset="-52"/>
+                    <a:cs typeface="PT Sans Narrow" charset="-52"/>
+                  </a:rPr>
+                  <a:t>mean_wr_func_bold.png</a:t>
+                </a:r>
+                <a:endParaRPr kumimoji="1" lang="en-US" altLang="ko-KR" sz="1200" dirty="0" smtClean="0">
+                  <a:latin typeface="PT Sans Narrow" charset="-52"/>
+                  <a:ea typeface="PT Sans Narrow" charset="-52"/>
+                  <a:cs typeface="PT Sans Narrow" charset="-52"/>
+                </a:endParaRPr>
+              </a:p>
+            </p:txBody>
+          </p:sp>
+        </p:grpSp>
+        <p:grpSp>
+          <p:nvGrpSpPr>
+            <p:cNvPr id="34" name="그룹 33"/>
+            <p:cNvGrpSpPr/>
+            <p:nvPr/>
+          </p:nvGrpSpPr>
+          <p:grpSpPr>
+            <a:xfrm>
+              <a:off x="4141367" y="4353340"/>
+              <a:ext cx="4730708" cy="3597452"/>
+              <a:chOff x="-1" y="4454026"/>
+              <a:chExt cx="4730708" cy="3597452"/>
+            </a:xfrm>
+          </p:grpSpPr>
+          <p:pic>
+            <p:nvPicPr>
+              <p:cNvPr id="32" name="그림 31"/>
+              <p:cNvPicPr>
+                <a:picLocks noChangeAspect="1"/>
+              </p:cNvPicPr>
+              <p:nvPr/>
+            </p:nvPicPr>
+            <p:blipFill>
+              <a:blip r:embed="rId5">
+                <a:extLst>
+                  <a:ext uri="{28A0092B-C50C-407E-A947-70E740481C1C}">
+                    <a14:useLocalDpi xmlns:a14="http://schemas.microsoft.com/office/drawing/2010/main" val="0"/>
+                  </a:ext>
+                </a:extLst>
+              </a:blip>
+              <a:stretch>
+                <a:fillRect/>
+              </a:stretch>
+            </p:blipFill>
+            <p:spPr>
+              <a:xfrm>
+                <a:off x="-1" y="4700559"/>
+                <a:ext cx="4730708" cy="3350919"/>
+              </a:xfrm>
+              <a:prstGeom prst="rect">
+                <a:avLst/>
+              </a:prstGeom>
+            </p:spPr>
+          </p:pic>
+          <p:sp>
+            <p:nvSpPr>
+              <p:cNvPr id="33" name="텍스트 상자 32"/>
+              <p:cNvSpPr txBox="1"/>
+              <p:nvPr/>
+            </p:nvSpPr>
+            <p:spPr>
+              <a:xfrm>
+                <a:off x="479691" y="4454026"/>
+                <a:ext cx="1503938" cy="276999"/>
+              </a:xfrm>
+              <a:prstGeom prst="rect">
+                <a:avLst/>
+              </a:prstGeom>
+              <a:solidFill>
+                <a:schemeClr val="bg1"/>
+              </a:solidFill>
+            </p:spPr>
+            <p:txBody>
+              <a:bodyPr wrap="none" rtlCol="0">
+                <a:spAutoFit/>
+              </a:bodyPr>
+              <a:lstStyle/>
+              <a:p>
+                <a:pPr algn="ctr"/>
+                <a:r>
+                  <a:rPr kumimoji="1" lang="en-US" altLang="ko-KR" sz="1200" smtClean="0">
+                    <a:latin typeface="PT Sans Narrow" charset="-52"/>
+                    <a:ea typeface="PT Sans Narrow" charset="-52"/>
+                    <a:cs typeface="PT Sans Narrow" charset="-52"/>
+                  </a:rPr>
+                  <a:t>mean_swr_func_bold.png</a:t>
+                </a:r>
+                <a:endParaRPr kumimoji="1" lang="en-US" altLang="ko-KR" sz="1200" dirty="0" smtClean="0">
+                  <a:latin typeface="PT Sans Narrow" charset="-52"/>
+                  <a:ea typeface="PT Sans Narrow" charset="-52"/>
+                  <a:cs typeface="PT Sans Narrow" charset="-52"/>
+                </a:endParaRPr>
+              </a:p>
+            </p:txBody>
+          </p:sp>
+        </p:grpSp>
+        <p:sp>
+          <p:nvSpPr>
+            <p:cNvPr id="37" name="직사각형 36"/>
+            <p:cNvSpPr/>
+            <p:nvPr/>
+          </p:nvSpPr>
+          <p:spPr>
+            <a:xfrm>
+              <a:off x="8793169" y="1328977"/>
+              <a:ext cx="3404340" cy="1461939"/>
+            </a:xfrm>
+            <a:prstGeom prst="rect">
+              <a:avLst/>
+            </a:prstGeom>
+          </p:spPr>
+          <p:txBody>
+            <a:bodyPr wrap="square">
+              <a:spAutoFit/>
+            </a:bodyPr>
+            <a:lstStyle/>
+            <a:p>
+              <a:r>
+                <a:rPr lang="en-US" altLang="ko-KR" sz="1200" dirty="0" smtClean="0">
+                  <a:latin typeface="PT Sans Narrow" charset="-52"/>
+                  <a:ea typeface="PT Sans Narrow" charset="-52"/>
+                  <a:cs typeface="PT Sans Narrow" charset="-52"/>
+                </a:rPr>
+                <a:t>qc_diary_dc_sub-caps003_task-CAPS_run-01_bold.txt</a:t>
+              </a:r>
+              <a:endParaRPr lang="en-US" altLang="ko-KR" sz="1200" dirty="0">
+                <a:latin typeface="PT Sans Narrow" charset="-52"/>
+                <a:ea typeface="PT Sans Narrow" charset="-52"/>
+                <a:cs typeface="PT Sans Narrow" charset="-52"/>
+              </a:endParaRPr>
+            </a:p>
+            <a:p>
+              <a:endParaRPr lang="en-US" altLang="ko-KR" sz="1100" dirty="0">
+                <a:latin typeface="PT Sans Narrow" charset="-52"/>
+                <a:ea typeface="PT Sans Narrow" charset="-52"/>
+                <a:cs typeface="PT Sans Narrow" charset="-52"/>
+              </a:endParaRPr>
+            </a:p>
+            <a:p>
+              <a:r>
+                <a:rPr lang="ko-KR" altLang="en-US" sz="1100" dirty="0" smtClean="0">
+                  <a:solidFill>
+                    <a:schemeClr val="tx1">
+                      <a:lumMod val="50000"/>
+                      <a:lumOff val="50000"/>
+                    </a:schemeClr>
+                  </a:solidFill>
+                  <a:latin typeface="PT Sans Narrow" charset="-52"/>
+                  <a:ea typeface="PT Sans Narrow" charset="-52"/>
+                  <a:cs typeface="PT Sans Narrow" charset="-52"/>
+                </a:rPr>
+                <a:t>Session   </a:t>
+              </a:r>
+              <a:r>
+                <a:rPr lang="ko-KR" altLang="en-US" sz="1100" dirty="0">
+                  <a:solidFill>
+                    <a:schemeClr val="tx1">
+                      <a:lumMod val="50000"/>
+                      <a:lumOff val="50000"/>
+                    </a:schemeClr>
+                  </a:solidFill>
+                  <a:latin typeface="PT Sans Narrow" charset="-52"/>
+                  <a:ea typeface="PT Sans Narrow" charset="-52"/>
+                  <a:cs typeface="PT Sans Narrow" charset="-52"/>
+                </a:rPr>
+                <a:t>1:  72 Potential outliers	</a:t>
+              </a:r>
+              <a:endParaRPr lang="en-US" altLang="ko-KR" sz="1100" dirty="0" smtClean="0">
+                <a:solidFill>
+                  <a:schemeClr val="tx1">
+                    <a:lumMod val="50000"/>
+                    <a:lumOff val="50000"/>
+                  </a:schemeClr>
+                </a:solidFill>
+                <a:latin typeface="PT Sans Narrow" charset="-52"/>
+                <a:ea typeface="PT Sans Narrow" charset="-52"/>
+                <a:cs typeface="PT Sans Narrow" charset="-52"/>
+              </a:endParaRPr>
+            </a:p>
+            <a:p>
+              <a:r>
+                <a:rPr lang="ko-KR" altLang="en-US" sz="1100" dirty="0" smtClean="0">
+                  <a:solidFill>
+                    <a:schemeClr val="tx1">
+                      <a:lumMod val="50000"/>
+                      <a:lumOff val="50000"/>
+                    </a:schemeClr>
+                  </a:solidFill>
+                  <a:latin typeface="PT Sans Narrow" charset="-52"/>
+                  <a:ea typeface="PT Sans Narrow" charset="-52"/>
+                  <a:cs typeface="PT Sans Narrow" charset="-52"/>
+                </a:rPr>
+                <a:t>%</a:t>
+              </a:r>
+              <a:r>
+                <a:rPr lang="ko-KR" altLang="en-US" sz="1100" dirty="0">
+                  <a:solidFill>
+                    <a:schemeClr val="tx1">
+                      <a:lumMod val="50000"/>
+                      <a:lumOff val="50000"/>
+                    </a:schemeClr>
+                  </a:solidFill>
+                  <a:latin typeface="PT Sans Narrow" charset="-52"/>
+                  <a:ea typeface="PT Sans Narrow" charset="-52"/>
+                  <a:cs typeface="PT Sans Narrow" charset="-52"/>
+                </a:rPr>
+                <a:t>Spikes: 2.78	</a:t>
+              </a:r>
+              <a:endParaRPr lang="en-US" altLang="ko-KR" sz="1100" dirty="0" smtClean="0">
+                <a:solidFill>
+                  <a:schemeClr val="tx1">
+                    <a:lumMod val="50000"/>
+                    <a:lumOff val="50000"/>
+                  </a:schemeClr>
+                </a:solidFill>
+                <a:latin typeface="PT Sans Narrow" charset="-52"/>
+                <a:ea typeface="PT Sans Narrow" charset="-52"/>
+                <a:cs typeface="PT Sans Narrow" charset="-52"/>
+              </a:endParaRPr>
+            </a:p>
+            <a:p>
+              <a:r>
+                <a:rPr lang="ko-KR" altLang="en-US" sz="1100" dirty="0" smtClean="0">
+                  <a:solidFill>
+                    <a:schemeClr val="tx1">
+                      <a:lumMod val="50000"/>
+                      <a:lumOff val="50000"/>
+                    </a:schemeClr>
+                  </a:solidFill>
+                  <a:latin typeface="PT Sans Narrow" charset="-52"/>
+                  <a:ea typeface="PT Sans Narrow" charset="-52"/>
+                  <a:cs typeface="PT Sans Narrow" charset="-52"/>
+                </a:rPr>
+                <a:t>Global </a:t>
+              </a:r>
+              <a:r>
+                <a:rPr lang="ko-KR" altLang="en-US" sz="1100" dirty="0">
+                  <a:solidFill>
+                    <a:schemeClr val="tx1">
+                      <a:lumMod val="50000"/>
+                      <a:lumOff val="50000"/>
+                    </a:schemeClr>
+                  </a:solidFill>
+                  <a:latin typeface="PT Sans Narrow" charset="-52"/>
+                  <a:ea typeface="PT Sans Narrow" charset="-52"/>
+                  <a:cs typeface="PT Sans Narrow" charset="-52"/>
+                </a:rPr>
+                <a:t>SNR (Mean/STD): </a:t>
+              </a:r>
+              <a:r>
+                <a:rPr lang="ko-KR" altLang="en-US" sz="1100" dirty="0" smtClean="0">
+                  <a:solidFill>
+                    <a:schemeClr val="tx1">
+                      <a:lumMod val="50000"/>
+                      <a:lumOff val="50000"/>
+                    </a:schemeClr>
+                  </a:solidFill>
+                  <a:latin typeface="PT Sans Narrow" charset="-52"/>
+                  <a:ea typeface="PT Sans Narrow" charset="-52"/>
+                  <a:cs typeface="PT Sans Narrow" charset="-52"/>
+                </a:rPr>
+                <a:t>299.12</a:t>
+              </a:r>
+              <a:endParaRPr lang="en-US" altLang="ko-KR" sz="1100" dirty="0" smtClean="0">
+                <a:solidFill>
+                  <a:schemeClr val="tx1">
+                    <a:lumMod val="50000"/>
+                    <a:lumOff val="50000"/>
+                  </a:schemeClr>
+                </a:solidFill>
+                <a:latin typeface="PT Sans Narrow" charset="-52"/>
+                <a:ea typeface="PT Sans Narrow" charset="-52"/>
+                <a:cs typeface="PT Sans Narrow" charset="-52"/>
+              </a:endParaRPr>
+            </a:p>
+            <a:p>
+              <a:r>
+                <a:rPr lang="ko-KR" altLang="en-US" sz="1100" dirty="0" smtClean="0">
+                  <a:solidFill>
+                    <a:schemeClr val="tx1">
+                      <a:lumMod val="50000"/>
+                      <a:lumOff val="50000"/>
+                    </a:schemeClr>
+                  </a:solidFill>
+                  <a:latin typeface="PT Sans Narrow" charset="-52"/>
+                  <a:ea typeface="PT Sans Narrow" charset="-52"/>
+                  <a:cs typeface="PT Sans Narrow" charset="-52"/>
+                </a:rPr>
+                <a:t>Added  </a:t>
+              </a:r>
+              <a:r>
+                <a:rPr lang="ko-KR" altLang="en-US" sz="1100" dirty="0">
+                  <a:solidFill>
+                    <a:schemeClr val="tx1">
+                      <a:lumMod val="50000"/>
+                      <a:lumOff val="50000"/>
+                    </a:schemeClr>
+                  </a:solidFill>
+                  <a:latin typeface="PT Sans Narrow" charset="-52"/>
+                  <a:ea typeface="PT Sans Narrow" charset="-52"/>
+                  <a:cs typeface="PT Sans Narrow" charset="-52"/>
+                </a:rPr>
+                <a:t>72 global/mahal outlier covariates to covariates field.Added  72 global/mahal outlier covariates to covariates field.Outliers in RMSSD images:   0%, 59 imgs.</a:t>
+              </a:r>
+            </a:p>
+          </p:txBody>
+        </p:sp>
+        <p:pic>
+          <p:nvPicPr>
+            <p:cNvPr id="38" name="그림 37"/>
+            <p:cNvPicPr>
+              <a:picLocks noChangeAspect="1"/>
+            </p:cNvPicPr>
+            <p:nvPr/>
+          </p:nvPicPr>
+          <p:blipFill>
+            <a:blip r:embed="rId6">
+              <a:extLst>
+                <a:ext uri="{28A0092B-C50C-407E-A947-70E740481C1C}">
+                  <a14:useLocalDpi xmlns:a14="http://schemas.microsoft.com/office/drawing/2010/main" val="0"/>
+                </a:ext>
+              </a:extLst>
+            </a:blip>
+            <a:stretch>
+              <a:fillRect/>
+            </a:stretch>
+          </p:blipFill>
+          <p:spPr>
+            <a:xfrm>
+              <a:off x="8607351" y="3937384"/>
+              <a:ext cx="3775977" cy="4011976"/>
+            </a:xfrm>
+            <a:prstGeom prst="rect">
+              <a:avLst/>
+            </a:prstGeom>
+          </p:spPr>
+        </p:pic>
+        <p:sp>
+          <p:nvSpPr>
+            <p:cNvPr id="39" name="직사각형 38"/>
+            <p:cNvSpPr/>
+            <p:nvPr/>
+          </p:nvSpPr>
+          <p:spPr>
+            <a:xfrm>
+              <a:off x="8787660" y="3660385"/>
+              <a:ext cx="3073277" cy="276999"/>
+            </a:xfrm>
+            <a:prstGeom prst="rect">
+              <a:avLst/>
+            </a:prstGeom>
+          </p:spPr>
+          <p:txBody>
+            <a:bodyPr wrap="none">
+              <a:spAutoFit/>
+            </a:bodyPr>
+            <a:lstStyle/>
+            <a:p>
+              <a:r>
+                <a:rPr lang="ko-KR" altLang="en-US" sz="1200" dirty="0">
+                  <a:latin typeface="PT Sans Narrow" charset="-52"/>
+                  <a:ea typeface="PT Sans Narrow" charset="-52"/>
+                  <a:cs typeface="PT Sans Narrow" charset="-52"/>
+                </a:rPr>
+                <a:t>qc_spike_plot_dc_sub-caps003_task-CAPS_run-01_bold</a:t>
+              </a:r>
+            </a:p>
+          </p:txBody>
+        </p:sp>
+        <p:sp>
+          <p:nvSpPr>
+            <p:cNvPr id="40" name="텍스트 상자 39"/>
+            <p:cNvSpPr txBox="1"/>
+            <p:nvPr/>
+          </p:nvSpPr>
+          <p:spPr>
+            <a:xfrm>
+              <a:off x="223993" y="241810"/>
+              <a:ext cx="1622560" cy="338554"/>
+            </a:xfrm>
+            <a:prstGeom prst="rect">
+              <a:avLst/>
+            </a:prstGeom>
+            <a:noFill/>
+          </p:spPr>
+          <p:txBody>
+            <a:bodyPr wrap="none" rtlCol="0">
+              <a:spAutoFit/>
+            </a:bodyPr>
+            <a:lstStyle/>
+            <a:p>
+              <a:r>
+                <a:rPr kumimoji="1" lang="en-US" altLang="ko-KR" sz="1600" b="1" dirty="0" smtClean="0">
+                  <a:solidFill>
+                    <a:srgbClr val="C00000"/>
+                  </a:solidFill>
+                  <a:latin typeface="PT Sans Narrow" charset="-52"/>
+                  <a:ea typeface="PT Sans Narrow" charset="-52"/>
+                  <a:cs typeface="PT Sans Narrow" charset="-52"/>
+                </a:rPr>
+                <a:t>Example QC images</a:t>
+              </a:r>
+              <a:endParaRPr kumimoji="1" lang="ko-KR" altLang="en-US" sz="1600" b="1" dirty="0">
+                <a:solidFill>
+                  <a:srgbClr val="C00000"/>
+                </a:solidFill>
+                <a:latin typeface="PT Sans Narrow" charset="-52"/>
+                <a:ea typeface="PT Sans Narrow" charset="-52"/>
+                <a:cs typeface="PT Sans Narrow" charset="-52"/>
+              </a:endParaRPr>
+            </a:p>
+          </p:txBody>
+        </p:sp>
+      </p:grpSp>
+    </p:spTree>
+    <p:extLst>
+      <p:ext uri="{BB962C8B-B14F-4D97-AF65-F5344CB8AC3E}">
+        <p14:creationId xmlns:p14="http://schemas.microsoft.com/office/powerpoint/2010/main" val="570061883"/>
       </p:ext>
     </p:extLst>
   </p:cSld>

</xml_diff>